<commit_message>
updating comparable slides day
</commit_message>
<xml_diff>
--- a/ClassMaterials/ComparableAndComparators/Slides/Part1-ComparableComparator.pptx
+++ b/ClassMaterials/ComparableAndComparators/Slides/Part1-ComparableComparator.pptx
@@ -422,7 +422,7 @@
               <a:pPr>
                 <a:defRPr/>
               </a:pPr>
-              <a:t>4/21/2025</a:t>
+              <a:t>5/26/2025</a:t>
             </a:fld>
             <a:endParaRPr lang="en-US"/>
           </a:p>
@@ -657,7 +657,7 @@
               <a:pPr>
                 <a:defRPr/>
               </a:pPr>
-              <a:t>4/21/2025</a:t>
+              <a:t>5/26/2025</a:t>
             </a:fld>
             <a:endParaRPr lang="en-US"/>
           </a:p>
@@ -2309,7 +2309,7 @@
               <a:pPr>
                 <a:defRPr/>
               </a:pPr>
-              <a:t>Monday, April 21, 2025</a:t>
+              <a:t>Monday, May 26, 2025</a:t>
             </a:fld>
             <a:endParaRPr lang="en-US" dirty="0"/>
           </a:p>
@@ -2492,7 +2492,7 @@
               <a:pPr>
                 <a:defRPr/>
               </a:pPr>
-              <a:t>Monday, April 21, 2025</a:t>
+              <a:t>Monday, May 26, 2025</a:t>
             </a:fld>
             <a:endParaRPr lang="en-US" dirty="0"/>
           </a:p>
@@ -2685,7 +2685,7 @@
               <a:pPr>
                 <a:defRPr/>
               </a:pPr>
-              <a:t>Monday, April 21, 2025</a:t>
+              <a:t>Monday, May 26, 2025</a:t>
             </a:fld>
             <a:endParaRPr lang="en-US" dirty="0"/>
           </a:p>
@@ -2868,7 +2868,7 @@
               <a:pPr>
                 <a:defRPr/>
               </a:pPr>
-              <a:t>Monday, April 21, 2025</a:t>
+              <a:t>Monday, May 26, 2025</a:t>
             </a:fld>
             <a:endParaRPr lang="en-US" dirty="0"/>
           </a:p>
@@ -3128,7 +3128,7 @@
               <a:pPr>
                 <a:defRPr/>
               </a:pPr>
-              <a:t>Monday, April 21, 2025</a:t>
+              <a:t>Monday, May 26, 2025</a:t>
             </a:fld>
             <a:endParaRPr lang="en-US"/>
           </a:p>
@@ -3428,7 +3428,7 @@
               <a:pPr>
                 <a:defRPr/>
               </a:pPr>
-              <a:t>Monday, April 21, 2025</a:t>
+              <a:t>Monday, May 26, 2025</a:t>
             </a:fld>
             <a:endParaRPr lang="en-US"/>
           </a:p>
@@ -3862,7 +3862,7 @@
               <a:pPr>
                 <a:defRPr/>
               </a:pPr>
-              <a:t>Monday, April 21, 2025</a:t>
+              <a:t>Monday, May 26, 2025</a:t>
             </a:fld>
             <a:endParaRPr lang="en-US"/>
           </a:p>
@@ -3994,7 +3994,7 @@
               <a:pPr>
                 <a:defRPr/>
               </a:pPr>
-              <a:t>Monday, April 21, 2025</a:t>
+              <a:t>Monday, May 26, 2025</a:t>
             </a:fld>
             <a:endParaRPr lang="en-US"/>
           </a:p>
@@ -4104,7 +4104,7 @@
               <a:pPr>
                 <a:defRPr/>
               </a:pPr>
-              <a:t>Monday, April 21, 2025</a:t>
+              <a:t>Monday, May 26, 2025</a:t>
             </a:fld>
             <a:endParaRPr lang="en-US" dirty="0"/>
           </a:p>
@@ -4394,7 +4394,7 @@
               <a:pPr>
                 <a:defRPr/>
               </a:pPr>
-              <a:t>Monday, April 21, 2025</a:t>
+              <a:t>Monday, May 26, 2025</a:t>
             </a:fld>
             <a:endParaRPr lang="en-US"/>
           </a:p>
@@ -4661,7 +4661,7 @@
               <a:pPr>
                 <a:defRPr/>
               </a:pPr>
-              <a:t>Monday, April 21, 2025</a:t>
+              <a:t>Monday, May 26, 2025</a:t>
             </a:fld>
             <a:endParaRPr lang="en-US"/>
           </a:p>
@@ -4887,7 +4887,7 @@
               <a:pPr>
                 <a:defRPr/>
               </a:pPr>
-              <a:t>Monday, April 21, 2025</a:t>
+              <a:t>Monday, May 26, 2025</a:t>
             </a:fld>
             <a:endParaRPr lang="en-US" dirty="0"/>
           </a:p>

</xml_diff>

<commit_message>
updating slides for the jar export
</commit_message>
<xml_diff>
--- a/ClassMaterials/ComparableAndComparators/Slides/Part1-ComparableComparator.pptx
+++ b/ClassMaterials/ComparableAndComparators/Slides/Part1-ComparableComparator.pptx
@@ -422,7 +422,7 @@
               <a:pPr>
                 <a:defRPr/>
               </a:pPr>
-              <a:t>5/26/2025</a:t>
+              <a:t>6/5/2025</a:t>
             </a:fld>
             <a:endParaRPr lang="en-US"/>
           </a:p>
@@ -657,7 +657,7 @@
               <a:pPr>
                 <a:defRPr/>
               </a:pPr>
-              <a:t>5/26/2025</a:t>
+              <a:t>6/5/2025</a:t>
             </a:fld>
             <a:endParaRPr lang="en-US"/>
           </a:p>
@@ -2309,7 +2309,7 @@
               <a:pPr>
                 <a:defRPr/>
               </a:pPr>
-              <a:t>Monday, May 26, 2025</a:t>
+              <a:t>Thursday, June 5, 2025</a:t>
             </a:fld>
             <a:endParaRPr lang="en-US" dirty="0"/>
           </a:p>
@@ -2492,7 +2492,7 @@
               <a:pPr>
                 <a:defRPr/>
               </a:pPr>
-              <a:t>Monday, May 26, 2025</a:t>
+              <a:t>Thursday, June 5, 2025</a:t>
             </a:fld>
             <a:endParaRPr lang="en-US" dirty="0"/>
           </a:p>
@@ -2685,7 +2685,7 @@
               <a:pPr>
                 <a:defRPr/>
               </a:pPr>
-              <a:t>Monday, May 26, 2025</a:t>
+              <a:t>Thursday, June 5, 2025</a:t>
             </a:fld>
             <a:endParaRPr lang="en-US" dirty="0"/>
           </a:p>
@@ -2868,7 +2868,7 @@
               <a:pPr>
                 <a:defRPr/>
               </a:pPr>
-              <a:t>Monday, May 26, 2025</a:t>
+              <a:t>Thursday, June 5, 2025</a:t>
             </a:fld>
             <a:endParaRPr lang="en-US" dirty="0"/>
           </a:p>
@@ -3128,7 +3128,7 @@
               <a:pPr>
                 <a:defRPr/>
               </a:pPr>
-              <a:t>Monday, May 26, 2025</a:t>
+              <a:t>Thursday, June 5, 2025</a:t>
             </a:fld>
             <a:endParaRPr lang="en-US"/>
           </a:p>
@@ -3428,7 +3428,7 @@
               <a:pPr>
                 <a:defRPr/>
               </a:pPr>
-              <a:t>Monday, May 26, 2025</a:t>
+              <a:t>Thursday, June 5, 2025</a:t>
             </a:fld>
             <a:endParaRPr lang="en-US"/>
           </a:p>
@@ -3862,7 +3862,7 @@
               <a:pPr>
                 <a:defRPr/>
               </a:pPr>
-              <a:t>Monday, May 26, 2025</a:t>
+              <a:t>Thursday, June 5, 2025</a:t>
             </a:fld>
             <a:endParaRPr lang="en-US"/>
           </a:p>
@@ -3994,7 +3994,7 @@
               <a:pPr>
                 <a:defRPr/>
               </a:pPr>
-              <a:t>Monday, May 26, 2025</a:t>
+              <a:t>Thursday, June 5, 2025</a:t>
             </a:fld>
             <a:endParaRPr lang="en-US"/>
           </a:p>
@@ -4104,7 +4104,7 @@
               <a:pPr>
                 <a:defRPr/>
               </a:pPr>
-              <a:t>Monday, May 26, 2025</a:t>
+              <a:t>Thursday, June 5, 2025</a:t>
             </a:fld>
             <a:endParaRPr lang="en-US" dirty="0"/>
           </a:p>
@@ -4394,7 +4394,7 @@
               <a:pPr>
                 <a:defRPr/>
               </a:pPr>
-              <a:t>Monday, May 26, 2025</a:t>
+              <a:t>Thursday, June 5, 2025</a:t>
             </a:fld>
             <a:endParaRPr lang="en-US"/>
           </a:p>
@@ -4661,7 +4661,7 @@
               <a:pPr>
                 <a:defRPr/>
               </a:pPr>
-              <a:t>Monday, May 26, 2025</a:t>
+              <a:t>Thursday, June 5, 2025</a:t>
             </a:fld>
             <a:endParaRPr lang="en-US"/>
           </a:p>
@@ -4887,7 +4887,7 @@
               <a:pPr>
                 <a:defRPr/>
               </a:pPr>
-              <a:t>Monday, May 26, 2025</a:t>
+              <a:t>Thursday, June 5, 2025</a:t>
             </a:fld>
             <a:endParaRPr lang="en-US" dirty="0"/>
           </a:p>
@@ -5349,7 +5349,7 @@
         <p:spPr>
           <a:xfrm>
             <a:off x="304800" y="4533900"/>
-            <a:ext cx="8534400" cy="2042264"/>
+            <a:ext cx="8534400" cy="2324100"/>
           </a:xfrm>
           <a:prstGeom prst="rect">
             <a:avLst/>
@@ -5426,6 +5426,17 @@
             <a:endParaRPr lang="en-US" sz="2400" i="1" dirty="0"/>
           </a:p>
           <a:p>
+            <a:pPr marL="342900" indent="-342900">
+              <a:buFont typeface="Arial" panose="020B0604020202020204" pitchFamily="34" charset="0"/>
+              <a:buChar char="•"/>
+            </a:pPr>
+            <a:r>
+              <a:rPr lang="en-US" sz="2400" i="1" dirty="0" err="1"/>
+              <a:t>PracticeSolutionChessJARDemo</a:t>
+            </a:r>
+            <a:endParaRPr lang="en-US" sz="2400" i="1" dirty="0"/>
+          </a:p>
+          <a:p>
             <a:r>
               <a:rPr lang="en-US" sz="2400" i="1" dirty="0"/>
               <a:t>This Quiz for today is:</a:t>
@@ -5474,7 +5485,7 @@
           </a:ln>
           <a:extLst>
             <a:ext uri="{C572A759-6A51-4108-AA02-DFA0A04FC94B}">
-              <ma14:wrappingTextBoxFlag xmlns:ma14="http://schemas.microsoft.com/office/mac/drawingml/2011/main" xmlns="" val="1"/>
+              <ma14:wrappingTextBoxFlag xmlns="" xmlns:ma14="http://schemas.microsoft.com/office/mac/drawingml/2011/main" val="1"/>
             </a:ext>
           </a:extLst>
         </p:spPr>
@@ -10481,6 +10492,15 @@
 </file>
 
 <file path=customXml/item1.xml><?xml version="1.0" encoding="utf-8"?>
+<?mso-contentType ?>
+<FormTemplates xmlns="http://schemas.microsoft.com/sharepoint/v3/contenttype/forms">
+  <Display>DocumentLibraryForm</Display>
+  <Edit>DocumentLibraryForm</Edit>
+  <New>DocumentLibraryForm</New>
+</FormTemplates>
+</file>
+
+<file path=customXml/item2.xml><?xml version="1.0" encoding="utf-8"?>
 <ct:contentTypeSchema xmlns:ct="http://schemas.microsoft.com/office/2006/metadata/contentType" xmlns:ma="http://schemas.microsoft.com/office/2006/metadata/properties/metaAttributes" ct:_="" ma:_="" ma:contentTypeName="Document" ma:contentTypeID="0x0101001570BCAAD2E4294F9443DCB038A55380" ma:contentTypeVersion="10" ma:contentTypeDescription="Create a new document." ma:contentTypeScope="" ma:versionID="84c2e02ee7a0dfaa743622fbac484332">
   <xsd:schema xmlns:xsd="http://www.w3.org/2001/XMLSchema" xmlns:xs="http://www.w3.org/2001/XMLSchema" xmlns:p="http://schemas.microsoft.com/office/2006/metadata/properties" xmlns:ns2="201674f6-2bdd-4f13-ba1e-424e4aa70473" targetNamespace="http://schemas.microsoft.com/office/2006/metadata/properties" ma:root="true" ma:fieldsID="0b220e6722f2c0d473d2d30e5cad202c" ns2:_="">
     <xsd:import namespace="201674f6-2bdd-4f13-ba1e-424e4aa70473"/>
@@ -10664,15 +10684,6 @@
 </ct:contentTypeSchema>
 </file>
 
-<file path=customXml/item2.xml><?xml version="1.0" encoding="utf-8"?>
-<?mso-contentType ?>
-<FormTemplates xmlns="http://schemas.microsoft.com/sharepoint/v3/contenttype/forms">
-  <Display>DocumentLibraryForm</Display>
-  <Edit>DocumentLibraryForm</Edit>
-  <New>DocumentLibraryForm</New>
-</FormTemplates>
-</file>
-
 <file path=customXml/item3.xml><?xml version="1.0" encoding="utf-8"?>
 <p:properties xmlns:p="http://schemas.microsoft.com/office/2006/metadata/properties" xmlns:xsi="http://www.w3.org/2001/XMLSchema-instance" xmlns:pc="http://schemas.microsoft.com/office/infopath/2007/PartnerControls">
   <documentManagement/>
@@ -10680,6 +10691,14 @@
 </file>
 
 <file path=customXml/itemProps1.xml><?xml version="1.0" encoding="utf-8"?>
+<ds:datastoreItem xmlns:ds="http://schemas.openxmlformats.org/officeDocument/2006/customXml" ds:itemID="{18BF21EC-2312-45E2-BCEE-8937A76D9E24}">
+  <ds:schemaRefs>
+    <ds:schemaRef ds:uri="http://schemas.microsoft.com/sharepoint/v3/contenttype/forms"/>
+  </ds:schemaRefs>
+</ds:datastoreItem>
+</file>
+
+<file path=customXml/itemProps2.xml><?xml version="1.0" encoding="utf-8"?>
 <ds:datastoreItem xmlns:ds="http://schemas.openxmlformats.org/officeDocument/2006/customXml" ds:itemID="{40A09E4F-BF38-48A0-AF6F-D0173F0C7B46}">
   <ds:schemaRefs>
     <ds:schemaRef ds:uri="http://schemas.microsoft.com/office/2006/metadata/contentType"/>
@@ -10697,14 +10716,6 @@
 </ds:datastoreItem>
 </file>
 
-<file path=customXml/itemProps2.xml><?xml version="1.0" encoding="utf-8"?>
-<ds:datastoreItem xmlns:ds="http://schemas.openxmlformats.org/officeDocument/2006/customXml" ds:itemID="{18BF21EC-2312-45E2-BCEE-8937A76D9E24}">
-  <ds:schemaRefs>
-    <ds:schemaRef ds:uri="http://schemas.microsoft.com/sharepoint/v3/contenttype/forms"/>
-  </ds:schemaRefs>
-</ds:datastoreItem>
-</file>
-
 <file path=customXml/itemProps3.xml><?xml version="1.0" encoding="utf-8"?>
 <ds:datastoreItem xmlns:ds="http://schemas.openxmlformats.org/officeDocument/2006/customXml" ds:itemID="{CFD45979-7452-4F9F-A6D3-7748092E7DDA}">
   <ds:schemaRefs>

</xml_diff>